<commit_message>
Adjustments made a long time ago and never previously committed.
</commit_message>
<xml_diff>
--- a/doc/Ga.pptx
+++ b/doc/Ga.pptx
@@ -112,6 +112,11 @@
       </a:defRPr>
     </a:lvl9pPr>
   </p:defaultTextStyle>
+  <p:extLst>
+    <p:ext uri="{EFAFB233-063F-42B5-8137-9DF3F51BA10A}">
+      <p15:sldGuideLst xmlns:p15="http://schemas.microsoft.com/office/powerpoint/2012/main"/>
+    </p:ext>
+  </p:extLst>
 </p:presentation>
 </file>
 
@@ -246,7 +251,7 @@
           <a:p>
             <a:fld id="{323939FA-970E-4ED4-9E90-B76CD5C732B0}" type="datetimeFigureOut">
               <a:rPr lang="en-US" smtClean="0"/>
-              <a:t>2016-09-11</a:t>
+              <a:t>2016-09-14</a:t>
             </a:fld>
             <a:endParaRPr lang="en-US"/>
           </a:p>
@@ -416,7 +421,7 @@
           <a:p>
             <a:fld id="{323939FA-970E-4ED4-9E90-B76CD5C732B0}" type="datetimeFigureOut">
               <a:rPr lang="en-US" smtClean="0"/>
-              <a:t>2016-09-11</a:t>
+              <a:t>2016-09-14</a:t>
             </a:fld>
             <a:endParaRPr lang="en-US"/>
           </a:p>
@@ -596,7 +601,7 @@
           <a:p>
             <a:fld id="{323939FA-970E-4ED4-9E90-B76CD5C732B0}" type="datetimeFigureOut">
               <a:rPr lang="en-US" smtClean="0"/>
-              <a:t>2016-09-11</a:t>
+              <a:t>2016-09-14</a:t>
             </a:fld>
             <a:endParaRPr lang="en-US"/>
           </a:p>
@@ -766,7 +771,7 @@
           <a:p>
             <a:fld id="{323939FA-970E-4ED4-9E90-B76CD5C732B0}" type="datetimeFigureOut">
               <a:rPr lang="en-US" smtClean="0"/>
-              <a:t>2016-09-11</a:t>
+              <a:t>2016-09-14</a:t>
             </a:fld>
             <a:endParaRPr lang="en-US"/>
           </a:p>
@@ -1012,7 +1017,7 @@
           <a:p>
             <a:fld id="{323939FA-970E-4ED4-9E90-B76CD5C732B0}" type="datetimeFigureOut">
               <a:rPr lang="en-US" smtClean="0"/>
-              <a:t>2016-09-11</a:t>
+              <a:t>2016-09-14</a:t>
             </a:fld>
             <a:endParaRPr lang="en-US"/>
           </a:p>
@@ -1244,7 +1249,7 @@
           <a:p>
             <a:fld id="{323939FA-970E-4ED4-9E90-B76CD5C732B0}" type="datetimeFigureOut">
               <a:rPr lang="en-US" smtClean="0"/>
-              <a:t>2016-09-11</a:t>
+              <a:t>2016-09-14</a:t>
             </a:fld>
             <a:endParaRPr lang="en-US"/>
           </a:p>
@@ -1611,7 +1616,7 @@
           <a:p>
             <a:fld id="{323939FA-970E-4ED4-9E90-B76CD5C732B0}" type="datetimeFigureOut">
               <a:rPr lang="en-US" smtClean="0"/>
-              <a:t>2016-09-11</a:t>
+              <a:t>2016-09-14</a:t>
             </a:fld>
             <a:endParaRPr lang="en-US"/>
           </a:p>
@@ -1729,7 +1734,7 @@
           <a:p>
             <a:fld id="{323939FA-970E-4ED4-9E90-B76CD5C732B0}" type="datetimeFigureOut">
               <a:rPr lang="en-US" smtClean="0"/>
-              <a:t>2016-09-11</a:t>
+              <a:t>2016-09-14</a:t>
             </a:fld>
             <a:endParaRPr lang="en-US"/>
           </a:p>
@@ -1824,7 +1829,7 @@
           <a:p>
             <a:fld id="{323939FA-970E-4ED4-9E90-B76CD5C732B0}" type="datetimeFigureOut">
               <a:rPr lang="en-US" smtClean="0"/>
-              <a:t>2016-09-11</a:t>
+              <a:t>2016-09-14</a:t>
             </a:fld>
             <a:endParaRPr lang="en-US"/>
           </a:p>
@@ -2101,7 +2106,7 @@
           <a:p>
             <a:fld id="{323939FA-970E-4ED4-9E90-B76CD5C732B0}" type="datetimeFigureOut">
               <a:rPr lang="en-US" smtClean="0"/>
-              <a:t>2016-09-11</a:t>
+              <a:t>2016-09-14</a:t>
             </a:fld>
             <a:endParaRPr lang="en-US"/>
           </a:p>
@@ -2354,7 +2359,7 @@
           <a:p>
             <a:fld id="{323939FA-970E-4ED4-9E90-B76CD5C732B0}" type="datetimeFigureOut">
               <a:rPr lang="en-US" smtClean="0"/>
-              <a:t>2016-09-11</a:t>
+              <a:t>2016-09-14</a:t>
             </a:fld>
             <a:endParaRPr lang="en-US"/>
           </a:p>
@@ -2567,7 +2572,7 @@
           <a:p>
             <a:fld id="{323939FA-970E-4ED4-9E90-B76CD5C732B0}" type="datetimeFigureOut">
               <a:rPr lang="en-US" smtClean="0"/>
-              <a:t>2016-09-11</a:t>
+              <a:t>2016-09-14</a:t>
             </a:fld>
             <a:endParaRPr lang="en-US"/>
           </a:p>
@@ -4130,7 +4135,19 @@
             <a:pPr lvl="1"/>
             <a:r>
               <a:rPr lang="en-US" dirty="0" smtClean="0"/>
-              <a:t>The JD number (12 characters, e.g.: 2417815.4650)</a:t>
+              <a:t>The </a:t>
+            </a:r>
+            <a:r>
+              <a:rPr lang="en-US" dirty="0" smtClean="0"/>
+              <a:t>JD number </a:t>
+            </a:r>
+            <a:r>
+              <a:rPr lang="en-US" dirty="0" smtClean="0"/>
+              <a:t>(12 </a:t>
+            </a:r>
+            <a:r>
+              <a:rPr lang="en-US" dirty="0" smtClean="0"/>
+              <a:t>characters, e.g.: 2417815.4650)</a:t>
             </a:r>
           </a:p>
           <a:p>
@@ -4144,7 +4161,15 @@
             <a:pPr lvl="1"/>
             <a:r>
               <a:rPr lang="en-US" dirty="0" smtClean="0"/>
-              <a:t>The precise position of the star on the sky (to 10 </a:t>
+              <a:t>The precise position of the star on the sky </a:t>
+            </a:r>
+            <a:r>
+              <a:rPr lang="en-US" dirty="0" smtClean="0"/>
+              <a:t>using ecliptic longitude and latitude (in degrees to </a:t>
+            </a:r>
+            <a:r>
+              <a:rPr lang="en-US" dirty="0" smtClean="0"/>
+              <a:t>10 </a:t>
             </a:r>
             <a:r>
               <a:rPr lang="el-GR" dirty="0" smtClean="0"/>
@@ -4152,8 +4177,21 @@
             </a:r>
             <a:r>
               <a:rPr lang="en-US" dirty="0" smtClean="0"/>
-              <a:t>as resolution, e.g.: 12h39m42.123456s +42d59m05.12345s)</a:t>
-            </a:r>
+              <a:t>as resolution, e.g.: </a:t>
+            </a:r>
+            <a:r>
+              <a:rPr lang="en-US" dirty="0" smtClean="0"/>
+              <a:t>+020.123456789,</a:t>
+            </a:r>
+            <a:r>
+              <a:rPr lang="en-US" dirty="0" smtClean="0"/>
+              <a:t>-20.123456789</a:t>
+            </a:r>
+            <a:r>
+              <a:rPr lang="en-US" dirty="0" smtClean="0"/>
+              <a:t>)</a:t>
+            </a:r>
+            <a:endParaRPr lang="en-US" dirty="0" smtClean="0"/>
           </a:p>
           <a:p>
             <a:pPr lvl="2"/>
@@ -4165,17 +4203,33 @@
           <a:p>
             <a:r>
               <a:rPr lang="en-US" dirty="0" smtClean="0"/>
-              <a:t>Total of 56 characters per observation</a:t>
-            </a:r>
-          </a:p>
-          <a:p>
-            <a:r>
-              <a:rPr lang="en-US" dirty="0" smtClean="0"/>
-              <a:t>Data Set = 56 * 17.8 billion = </a:t>
+              <a:t>Total of </a:t>
+            </a:r>
+            <a:r>
+              <a:rPr lang="en-US" dirty="0" smtClean="0"/>
+              <a:t>51 </a:t>
+            </a:r>
+            <a:r>
+              <a:rPr lang="en-US" dirty="0" smtClean="0"/>
+              <a:t>characters per observation</a:t>
+            </a:r>
+          </a:p>
+          <a:p>
+            <a:r>
+              <a:rPr lang="en-US" dirty="0" smtClean="0"/>
+              <a:t>Data Set = </a:t>
+            </a:r>
+            <a:r>
+              <a:rPr lang="en-US" dirty="0" smtClean="0"/>
+              <a:t>51 </a:t>
+            </a:r>
+            <a:r>
+              <a:rPr lang="en-US" dirty="0" smtClean="0"/>
+              <a:t>* 17.8 billion = </a:t>
             </a:r>
             <a:r>
               <a:rPr lang="en-US" b="1" dirty="0" smtClean="0"/>
-              <a:t>996.8 </a:t>
+              <a:t>908 </a:t>
             </a:r>
             <a:r>
               <a:rPr lang="en-US" b="1" dirty="0" err="1" smtClean="0"/>

</xml_diff>

<commit_message>
Minor modification of the Ga presentation.
</commit_message>
<xml_diff>
--- a/doc/Ga.pptx
+++ b/doc/Ga.pptx
@@ -162,10 +162,9 @@
           </a:lstStyle>
           <a:p>
             <a:r>
-              <a:rPr lang="en-US" smtClean="0"/>
+              <a:rPr lang="en-US"/>
               <a:t>Click to edit Master title style</a:t>
             </a:r>
-            <a:endParaRPr lang="en-US"/>
           </a:p>
         </p:txBody>
       </p:sp>
@@ -227,10 +226,9 @@
           </a:lstStyle>
           <a:p>
             <a:r>
-              <a:rPr lang="en-US" smtClean="0"/>
+              <a:rPr lang="en-US"/>
               <a:t>Click to edit Master subtitle style</a:t>
             </a:r>
-            <a:endParaRPr lang="en-US"/>
           </a:p>
         </p:txBody>
       </p:sp>
@@ -251,7 +249,7 @@
           <a:p>
             <a:fld id="{323939FA-970E-4ED4-9E90-B76CD5C732B0}" type="datetimeFigureOut">
               <a:rPr lang="en-US" smtClean="0"/>
-              <a:t>2016-09-14</a:t>
+              <a:t>2020-09-08</a:t>
             </a:fld>
             <a:endParaRPr lang="en-US"/>
           </a:p>
@@ -345,10 +343,9 @@
           <a:lstStyle/>
           <a:p>
             <a:r>
-              <a:rPr lang="en-US" smtClean="0"/>
+              <a:rPr lang="en-US"/>
               <a:t>Click to edit Master title style</a:t>
             </a:r>
-            <a:endParaRPr lang="en-US"/>
           </a:p>
         </p:txBody>
       </p:sp>
@@ -369,38 +366,37 @@
           <a:p>
             <a:pPr lvl="0"/>
             <a:r>
-              <a:rPr lang="en-US" smtClean="0"/>
+              <a:rPr lang="en-US"/>
               <a:t>Click to edit Master text styles</a:t>
             </a:r>
           </a:p>
           <a:p>
             <a:pPr lvl="1"/>
             <a:r>
-              <a:rPr lang="en-US" smtClean="0"/>
+              <a:rPr lang="en-US"/>
               <a:t>Second level</a:t>
             </a:r>
           </a:p>
           <a:p>
             <a:pPr lvl="2"/>
             <a:r>
-              <a:rPr lang="en-US" smtClean="0"/>
+              <a:rPr lang="en-US"/>
               <a:t>Third level</a:t>
             </a:r>
           </a:p>
           <a:p>
             <a:pPr lvl="3"/>
             <a:r>
-              <a:rPr lang="en-US" smtClean="0"/>
+              <a:rPr lang="en-US"/>
               <a:t>Fourth level</a:t>
             </a:r>
           </a:p>
           <a:p>
             <a:pPr lvl="4"/>
             <a:r>
-              <a:rPr lang="en-US" smtClean="0"/>
+              <a:rPr lang="en-US"/>
               <a:t>Fifth level</a:t>
             </a:r>
-            <a:endParaRPr lang="en-US"/>
           </a:p>
         </p:txBody>
       </p:sp>
@@ -421,7 +417,7 @@
           <a:p>
             <a:fld id="{323939FA-970E-4ED4-9E90-B76CD5C732B0}" type="datetimeFigureOut">
               <a:rPr lang="en-US" smtClean="0"/>
-              <a:t>2016-09-14</a:t>
+              <a:t>2020-09-08</a:t>
             </a:fld>
             <a:endParaRPr lang="en-US"/>
           </a:p>
@@ -520,10 +516,9 @@
           <a:lstStyle/>
           <a:p>
             <a:r>
-              <a:rPr lang="en-US" smtClean="0"/>
+              <a:rPr lang="en-US"/>
               <a:t>Click to edit Master title style</a:t>
             </a:r>
-            <a:endParaRPr lang="en-US"/>
           </a:p>
         </p:txBody>
       </p:sp>
@@ -549,38 +544,37 @@
           <a:p>
             <a:pPr lvl="0"/>
             <a:r>
-              <a:rPr lang="en-US" smtClean="0"/>
+              <a:rPr lang="en-US"/>
               <a:t>Click to edit Master text styles</a:t>
             </a:r>
           </a:p>
           <a:p>
             <a:pPr lvl="1"/>
             <a:r>
-              <a:rPr lang="en-US" smtClean="0"/>
+              <a:rPr lang="en-US"/>
               <a:t>Second level</a:t>
             </a:r>
           </a:p>
           <a:p>
             <a:pPr lvl="2"/>
             <a:r>
-              <a:rPr lang="en-US" smtClean="0"/>
+              <a:rPr lang="en-US"/>
               <a:t>Third level</a:t>
             </a:r>
           </a:p>
           <a:p>
             <a:pPr lvl="3"/>
             <a:r>
-              <a:rPr lang="en-US" smtClean="0"/>
+              <a:rPr lang="en-US"/>
               <a:t>Fourth level</a:t>
             </a:r>
           </a:p>
           <a:p>
             <a:pPr lvl="4"/>
             <a:r>
-              <a:rPr lang="en-US" smtClean="0"/>
+              <a:rPr lang="en-US"/>
               <a:t>Fifth level</a:t>
             </a:r>
-            <a:endParaRPr lang="en-US"/>
           </a:p>
         </p:txBody>
       </p:sp>
@@ -601,7 +595,7 @@
           <a:p>
             <a:fld id="{323939FA-970E-4ED4-9E90-B76CD5C732B0}" type="datetimeFigureOut">
               <a:rPr lang="en-US" smtClean="0"/>
-              <a:t>2016-09-14</a:t>
+              <a:t>2020-09-08</a:t>
             </a:fld>
             <a:endParaRPr lang="en-US"/>
           </a:p>
@@ -695,10 +689,9 @@
           <a:lstStyle/>
           <a:p>
             <a:r>
-              <a:rPr lang="en-US" smtClean="0"/>
+              <a:rPr lang="en-US"/>
               <a:t>Click to edit Master title style</a:t>
             </a:r>
-            <a:endParaRPr lang="en-US"/>
           </a:p>
         </p:txBody>
       </p:sp>
@@ -719,38 +712,37 @@
           <a:p>
             <a:pPr lvl="0"/>
             <a:r>
-              <a:rPr lang="en-US" smtClean="0"/>
+              <a:rPr lang="en-US"/>
               <a:t>Click to edit Master text styles</a:t>
             </a:r>
           </a:p>
           <a:p>
             <a:pPr lvl="1"/>
             <a:r>
-              <a:rPr lang="en-US" smtClean="0"/>
+              <a:rPr lang="en-US"/>
               <a:t>Second level</a:t>
             </a:r>
           </a:p>
           <a:p>
             <a:pPr lvl="2"/>
             <a:r>
-              <a:rPr lang="en-US" smtClean="0"/>
+              <a:rPr lang="en-US"/>
               <a:t>Third level</a:t>
             </a:r>
           </a:p>
           <a:p>
             <a:pPr lvl="3"/>
             <a:r>
-              <a:rPr lang="en-US" smtClean="0"/>
+              <a:rPr lang="en-US"/>
               <a:t>Fourth level</a:t>
             </a:r>
           </a:p>
           <a:p>
             <a:pPr lvl="4"/>
             <a:r>
-              <a:rPr lang="en-US" smtClean="0"/>
+              <a:rPr lang="en-US"/>
               <a:t>Fifth level</a:t>
             </a:r>
-            <a:endParaRPr lang="en-US"/>
           </a:p>
         </p:txBody>
       </p:sp>
@@ -771,7 +763,7 @@
           <a:p>
             <a:fld id="{323939FA-970E-4ED4-9E90-B76CD5C732B0}" type="datetimeFigureOut">
               <a:rPr lang="en-US" smtClean="0"/>
-              <a:t>2016-09-14</a:t>
+              <a:t>2020-09-08</a:t>
             </a:fld>
             <a:endParaRPr lang="en-US"/>
           </a:p>
@@ -874,10 +866,9 @@
           </a:lstStyle>
           <a:p>
             <a:r>
-              <a:rPr lang="en-US" smtClean="0"/>
+              <a:rPr lang="en-US"/>
               <a:t>Click to edit Master title style</a:t>
             </a:r>
-            <a:endParaRPr lang="en-US"/>
           </a:p>
         </p:txBody>
       </p:sp>
@@ -994,7 +985,7 @@
           <a:p>
             <a:pPr lvl="0"/>
             <a:r>
-              <a:rPr lang="en-US" smtClean="0"/>
+              <a:rPr lang="en-US"/>
               <a:t>Click to edit Master text styles</a:t>
             </a:r>
           </a:p>
@@ -1017,7 +1008,7 @@
           <a:p>
             <a:fld id="{323939FA-970E-4ED4-9E90-B76CD5C732B0}" type="datetimeFigureOut">
               <a:rPr lang="en-US" smtClean="0"/>
-              <a:t>2016-09-14</a:t>
+              <a:t>2020-09-08</a:t>
             </a:fld>
             <a:endParaRPr lang="en-US"/>
           </a:p>
@@ -1111,10 +1102,9 @@
           <a:lstStyle/>
           <a:p>
             <a:r>
-              <a:rPr lang="en-US" smtClean="0"/>
+              <a:rPr lang="en-US"/>
               <a:t>Click to edit Master title style</a:t>
             </a:r>
-            <a:endParaRPr lang="en-US"/>
           </a:p>
         </p:txBody>
       </p:sp>
@@ -1140,38 +1130,37 @@
           <a:p>
             <a:pPr lvl="0"/>
             <a:r>
-              <a:rPr lang="en-US" smtClean="0"/>
+              <a:rPr lang="en-US"/>
               <a:t>Click to edit Master text styles</a:t>
             </a:r>
           </a:p>
           <a:p>
             <a:pPr lvl="1"/>
             <a:r>
-              <a:rPr lang="en-US" smtClean="0"/>
+              <a:rPr lang="en-US"/>
               <a:t>Second level</a:t>
             </a:r>
           </a:p>
           <a:p>
             <a:pPr lvl="2"/>
             <a:r>
-              <a:rPr lang="en-US" smtClean="0"/>
+              <a:rPr lang="en-US"/>
               <a:t>Third level</a:t>
             </a:r>
           </a:p>
           <a:p>
             <a:pPr lvl="3"/>
             <a:r>
-              <a:rPr lang="en-US" smtClean="0"/>
+              <a:rPr lang="en-US"/>
               <a:t>Fourth level</a:t>
             </a:r>
           </a:p>
           <a:p>
             <a:pPr lvl="4"/>
             <a:r>
-              <a:rPr lang="en-US" smtClean="0"/>
+              <a:rPr lang="en-US"/>
               <a:t>Fifth level</a:t>
             </a:r>
-            <a:endParaRPr lang="en-US"/>
           </a:p>
         </p:txBody>
       </p:sp>
@@ -1197,38 +1186,37 @@
           <a:p>
             <a:pPr lvl="0"/>
             <a:r>
-              <a:rPr lang="en-US" smtClean="0"/>
+              <a:rPr lang="en-US"/>
               <a:t>Click to edit Master text styles</a:t>
             </a:r>
           </a:p>
           <a:p>
             <a:pPr lvl="1"/>
             <a:r>
-              <a:rPr lang="en-US" smtClean="0"/>
+              <a:rPr lang="en-US"/>
               <a:t>Second level</a:t>
             </a:r>
           </a:p>
           <a:p>
             <a:pPr lvl="2"/>
             <a:r>
-              <a:rPr lang="en-US" smtClean="0"/>
+              <a:rPr lang="en-US"/>
               <a:t>Third level</a:t>
             </a:r>
           </a:p>
           <a:p>
             <a:pPr lvl="3"/>
             <a:r>
-              <a:rPr lang="en-US" smtClean="0"/>
+              <a:rPr lang="en-US"/>
               <a:t>Fourth level</a:t>
             </a:r>
           </a:p>
           <a:p>
             <a:pPr lvl="4"/>
             <a:r>
-              <a:rPr lang="en-US" smtClean="0"/>
+              <a:rPr lang="en-US"/>
               <a:t>Fifth level</a:t>
             </a:r>
-            <a:endParaRPr lang="en-US"/>
           </a:p>
         </p:txBody>
       </p:sp>
@@ -1249,7 +1237,7 @@
           <a:p>
             <a:fld id="{323939FA-970E-4ED4-9E90-B76CD5C732B0}" type="datetimeFigureOut">
               <a:rPr lang="en-US" smtClean="0"/>
-              <a:t>2016-09-14</a:t>
+              <a:t>2020-09-08</a:t>
             </a:fld>
             <a:endParaRPr lang="en-US"/>
           </a:p>
@@ -1348,10 +1336,9 @@
           <a:lstStyle/>
           <a:p>
             <a:r>
-              <a:rPr lang="en-US" smtClean="0"/>
+              <a:rPr lang="en-US"/>
               <a:t>Click to edit Master title style</a:t>
             </a:r>
-            <a:endParaRPr lang="en-US"/>
           </a:p>
         </p:txBody>
       </p:sp>
@@ -1414,7 +1401,7 @@
           <a:p>
             <a:pPr lvl="0"/>
             <a:r>
-              <a:rPr lang="en-US" smtClean="0"/>
+              <a:rPr lang="en-US"/>
               <a:t>Click to edit Master text styles</a:t>
             </a:r>
           </a:p>
@@ -1442,38 +1429,37 @@
           <a:p>
             <a:pPr lvl="0"/>
             <a:r>
-              <a:rPr lang="en-US" smtClean="0"/>
+              <a:rPr lang="en-US"/>
               <a:t>Click to edit Master text styles</a:t>
             </a:r>
           </a:p>
           <a:p>
             <a:pPr lvl="1"/>
             <a:r>
-              <a:rPr lang="en-US" smtClean="0"/>
+              <a:rPr lang="en-US"/>
               <a:t>Second level</a:t>
             </a:r>
           </a:p>
           <a:p>
             <a:pPr lvl="2"/>
             <a:r>
-              <a:rPr lang="en-US" smtClean="0"/>
+              <a:rPr lang="en-US"/>
               <a:t>Third level</a:t>
             </a:r>
           </a:p>
           <a:p>
             <a:pPr lvl="3"/>
             <a:r>
-              <a:rPr lang="en-US" smtClean="0"/>
+              <a:rPr lang="en-US"/>
               <a:t>Fourth level</a:t>
             </a:r>
           </a:p>
           <a:p>
             <a:pPr lvl="4"/>
             <a:r>
-              <a:rPr lang="en-US" smtClean="0"/>
+              <a:rPr lang="en-US"/>
               <a:t>Fifth level</a:t>
             </a:r>
-            <a:endParaRPr lang="en-US"/>
           </a:p>
         </p:txBody>
       </p:sp>
@@ -1536,7 +1522,7 @@
           <a:p>
             <a:pPr lvl="0"/>
             <a:r>
-              <a:rPr lang="en-US" smtClean="0"/>
+              <a:rPr lang="en-US"/>
               <a:t>Click to edit Master text styles</a:t>
             </a:r>
           </a:p>
@@ -1564,38 +1550,37 @@
           <a:p>
             <a:pPr lvl="0"/>
             <a:r>
-              <a:rPr lang="en-US" smtClean="0"/>
+              <a:rPr lang="en-US"/>
               <a:t>Click to edit Master text styles</a:t>
             </a:r>
           </a:p>
           <a:p>
             <a:pPr lvl="1"/>
             <a:r>
-              <a:rPr lang="en-US" smtClean="0"/>
+              <a:rPr lang="en-US"/>
               <a:t>Second level</a:t>
             </a:r>
           </a:p>
           <a:p>
             <a:pPr lvl="2"/>
             <a:r>
-              <a:rPr lang="en-US" smtClean="0"/>
+              <a:rPr lang="en-US"/>
               <a:t>Third level</a:t>
             </a:r>
           </a:p>
           <a:p>
             <a:pPr lvl="3"/>
             <a:r>
-              <a:rPr lang="en-US" smtClean="0"/>
+              <a:rPr lang="en-US"/>
               <a:t>Fourth level</a:t>
             </a:r>
           </a:p>
           <a:p>
             <a:pPr lvl="4"/>
             <a:r>
-              <a:rPr lang="en-US" smtClean="0"/>
+              <a:rPr lang="en-US"/>
               <a:t>Fifth level</a:t>
             </a:r>
-            <a:endParaRPr lang="en-US"/>
           </a:p>
         </p:txBody>
       </p:sp>
@@ -1616,7 +1601,7 @@
           <a:p>
             <a:fld id="{323939FA-970E-4ED4-9E90-B76CD5C732B0}" type="datetimeFigureOut">
               <a:rPr lang="en-US" smtClean="0"/>
-              <a:t>2016-09-14</a:t>
+              <a:t>2020-09-08</a:t>
             </a:fld>
             <a:endParaRPr lang="en-US"/>
           </a:p>
@@ -1710,10 +1695,9 @@
           <a:lstStyle/>
           <a:p>
             <a:r>
-              <a:rPr lang="en-US" smtClean="0"/>
+              <a:rPr lang="en-US"/>
               <a:t>Click to edit Master title style</a:t>
             </a:r>
-            <a:endParaRPr lang="en-US"/>
           </a:p>
         </p:txBody>
       </p:sp>
@@ -1734,7 +1718,7 @@
           <a:p>
             <a:fld id="{323939FA-970E-4ED4-9E90-B76CD5C732B0}" type="datetimeFigureOut">
               <a:rPr lang="en-US" smtClean="0"/>
-              <a:t>2016-09-14</a:t>
+              <a:t>2020-09-08</a:t>
             </a:fld>
             <a:endParaRPr lang="en-US"/>
           </a:p>
@@ -1829,7 +1813,7 @@
           <a:p>
             <a:fld id="{323939FA-970E-4ED4-9E90-B76CD5C732B0}" type="datetimeFigureOut">
               <a:rPr lang="en-US" smtClean="0"/>
-              <a:t>2016-09-14</a:t>
+              <a:t>2020-09-08</a:t>
             </a:fld>
             <a:endParaRPr lang="en-US"/>
           </a:p>
@@ -1932,10 +1916,9 @@
           </a:lstStyle>
           <a:p>
             <a:r>
-              <a:rPr lang="en-US" smtClean="0"/>
+              <a:rPr lang="en-US"/>
               <a:t>Click to edit Master title style</a:t>
             </a:r>
-            <a:endParaRPr lang="en-US"/>
           </a:p>
         </p:txBody>
       </p:sp>
@@ -1989,38 +1972,37 @@
           <a:p>
             <a:pPr lvl="0"/>
             <a:r>
-              <a:rPr lang="en-US" smtClean="0"/>
+              <a:rPr lang="en-US"/>
               <a:t>Click to edit Master text styles</a:t>
             </a:r>
           </a:p>
           <a:p>
             <a:pPr lvl="1"/>
             <a:r>
-              <a:rPr lang="en-US" smtClean="0"/>
+              <a:rPr lang="en-US"/>
               <a:t>Second level</a:t>
             </a:r>
           </a:p>
           <a:p>
             <a:pPr lvl="2"/>
             <a:r>
-              <a:rPr lang="en-US" smtClean="0"/>
+              <a:rPr lang="en-US"/>
               <a:t>Third level</a:t>
             </a:r>
           </a:p>
           <a:p>
             <a:pPr lvl="3"/>
             <a:r>
-              <a:rPr lang="en-US" smtClean="0"/>
+              <a:rPr lang="en-US"/>
               <a:t>Fourth level</a:t>
             </a:r>
           </a:p>
           <a:p>
             <a:pPr lvl="4"/>
             <a:r>
-              <a:rPr lang="en-US" smtClean="0"/>
+              <a:rPr lang="en-US"/>
               <a:t>Fifth level</a:t>
             </a:r>
-            <a:endParaRPr lang="en-US"/>
           </a:p>
         </p:txBody>
       </p:sp>
@@ -2083,7 +2065,7 @@
           <a:p>
             <a:pPr lvl="0"/>
             <a:r>
-              <a:rPr lang="en-US" smtClean="0"/>
+              <a:rPr lang="en-US"/>
               <a:t>Click to edit Master text styles</a:t>
             </a:r>
           </a:p>
@@ -2106,7 +2088,7 @@
           <a:p>
             <a:fld id="{323939FA-970E-4ED4-9E90-B76CD5C732B0}" type="datetimeFigureOut">
               <a:rPr lang="en-US" smtClean="0"/>
-              <a:t>2016-09-14</a:t>
+              <a:t>2020-09-08</a:t>
             </a:fld>
             <a:endParaRPr lang="en-US"/>
           </a:p>
@@ -2209,10 +2191,9 @@
           </a:lstStyle>
           <a:p>
             <a:r>
-              <a:rPr lang="en-US" smtClean="0"/>
+              <a:rPr lang="en-US"/>
               <a:t>Click to edit Master title style</a:t>
             </a:r>
-            <a:endParaRPr lang="en-US"/>
           </a:p>
         </p:txBody>
       </p:sp>
@@ -2336,7 +2317,7 @@
           <a:p>
             <a:pPr lvl="0"/>
             <a:r>
-              <a:rPr lang="en-US" smtClean="0"/>
+              <a:rPr lang="en-US"/>
               <a:t>Click to edit Master text styles</a:t>
             </a:r>
           </a:p>
@@ -2359,7 +2340,7 @@
           <a:p>
             <a:fld id="{323939FA-970E-4ED4-9E90-B76CD5C732B0}" type="datetimeFigureOut">
               <a:rPr lang="en-US" smtClean="0"/>
-              <a:t>2016-09-14</a:t>
+              <a:t>2020-09-08</a:t>
             </a:fld>
             <a:endParaRPr lang="en-US"/>
           </a:p>
@@ -2468,10 +2449,9 @@
           <a:lstStyle/>
           <a:p>
             <a:r>
-              <a:rPr lang="en-US" smtClean="0"/>
+              <a:rPr lang="en-US"/>
               <a:t>Click to edit Master title style</a:t>
             </a:r>
-            <a:endParaRPr lang="en-US"/>
           </a:p>
         </p:txBody>
       </p:sp>
@@ -2502,38 +2482,37 @@
           <a:p>
             <a:pPr lvl="0"/>
             <a:r>
-              <a:rPr lang="en-US" smtClean="0"/>
+              <a:rPr lang="en-US"/>
               <a:t>Click to edit Master text styles</a:t>
             </a:r>
           </a:p>
           <a:p>
             <a:pPr lvl="1"/>
             <a:r>
-              <a:rPr lang="en-US" smtClean="0"/>
+              <a:rPr lang="en-US"/>
               <a:t>Second level</a:t>
             </a:r>
           </a:p>
           <a:p>
             <a:pPr lvl="2"/>
             <a:r>
-              <a:rPr lang="en-US" smtClean="0"/>
+              <a:rPr lang="en-US"/>
               <a:t>Third level</a:t>
             </a:r>
           </a:p>
           <a:p>
             <a:pPr lvl="3"/>
             <a:r>
-              <a:rPr lang="en-US" smtClean="0"/>
+              <a:rPr lang="en-US"/>
               <a:t>Fourth level</a:t>
             </a:r>
           </a:p>
           <a:p>
             <a:pPr lvl="4"/>
             <a:r>
-              <a:rPr lang="en-US" smtClean="0"/>
+              <a:rPr lang="en-US"/>
               <a:t>Fifth level</a:t>
             </a:r>
-            <a:endParaRPr lang="en-US"/>
           </a:p>
         </p:txBody>
       </p:sp>
@@ -2572,7 +2551,7 @@
           <a:p>
             <a:fld id="{323939FA-970E-4ED4-9E90-B76CD5C732B0}" type="datetimeFigureOut">
               <a:rPr lang="en-US" smtClean="0"/>
-              <a:t>2016-09-14</a:t>
+              <a:t>2020-09-08</a:t>
             </a:fld>
             <a:endParaRPr lang="en-US"/>
           </a:p>
@@ -2993,18 +2972,17 @@
           <a:lstStyle/>
           <a:p>
             <a:r>
-              <a:rPr lang="en-US" dirty="0" smtClean="0"/>
+              <a:rPr lang="en-US" dirty="0"/>
               <a:t>The </a:t>
             </a:r>
             <a:r>
-              <a:rPr lang="en-US" i="1" dirty="0" smtClean="0"/>
+              <a:rPr lang="en-US" i="1" dirty="0"/>
               <a:t>Ga</a:t>
             </a:r>
             <a:r>
-              <a:rPr lang="en-US" dirty="0" smtClean="0"/>
+              <a:rPr lang="en-US" dirty="0"/>
               <a:t> Astrometric Database</a:t>
             </a:r>
-            <a:endParaRPr lang="en-US" dirty="0"/>
           </a:p>
         </p:txBody>
       </p:sp>
@@ -3024,16 +3002,15 @@
           <a:lstStyle/>
           <a:p>
             <a:r>
-              <a:rPr lang="en-US" dirty="0" smtClean="0"/>
+              <a:rPr lang="en-US" dirty="0"/>
               <a:t>Big Data Processing</a:t>
             </a:r>
           </a:p>
           <a:p>
             <a:r>
-              <a:rPr lang="en-US" dirty="0" smtClean="0"/>
+              <a:rPr lang="en-US" dirty="0"/>
               <a:t>Vermont Technical College</a:t>
             </a:r>
-            <a:endParaRPr lang="en-US" dirty="0"/>
           </a:p>
         </p:txBody>
       </p:sp>
@@ -3047,13 +3024,6 @@
   <p:clrMapOvr>
     <a:masterClrMapping/>
   </p:clrMapOvr>
-  <p:timing>
-    <p:tnLst>
-      <p:par>
-        <p:cTn id="1" dur="indefinite" restart="never" nodeType="tmRoot"/>
-      </p:par>
-    </p:tnLst>
-  </p:timing>
 </p:sld>
 </file>
 
@@ -3090,10 +3060,9 @@
           <a:lstStyle/>
           <a:p>
             <a:r>
-              <a:rPr lang="en-US" dirty="0" smtClean="0"/>
+              <a:rPr lang="en-US" dirty="0"/>
               <a:t>Like Gaia, Only Not Really</a:t>
             </a:r>
-            <a:endParaRPr lang="en-US" dirty="0"/>
           </a:p>
         </p:txBody>
       </p:sp>
@@ -3113,71 +3082,71 @@
           <a:lstStyle/>
           <a:p>
             <a:r>
-              <a:rPr lang="en-US" dirty="0" smtClean="0"/>
+              <a:rPr lang="en-US" dirty="0"/>
               <a:t>Gaia is a European Space Agency Mission</a:t>
             </a:r>
           </a:p>
           <a:p>
             <a:pPr lvl="1"/>
             <a:r>
-              <a:rPr lang="en-US" dirty="0" smtClean="0"/>
+              <a:rPr lang="en-US" dirty="0"/>
               <a:t>Measures accurate positions and radial velocities of 1 billion stars</a:t>
             </a:r>
           </a:p>
           <a:p>
             <a:pPr lvl="1"/>
             <a:r>
-              <a:rPr lang="en-US" dirty="0" smtClean="0"/>
+              <a:rPr lang="en-US" dirty="0"/>
               <a:t>Requires multiple measurements of each star over a five year period</a:t>
             </a:r>
           </a:p>
           <a:p>
             <a:pPr lvl="1"/>
             <a:r>
-              <a:rPr lang="en-US" dirty="0" smtClean="0"/>
+              <a:rPr lang="en-US" dirty="0"/>
               <a:t>Will allow us to make a 3D map of this region of the galaxy</a:t>
             </a:r>
           </a:p>
           <a:p>
             <a:pPr lvl="2"/>
             <a:r>
-              <a:rPr lang="en-US" dirty="0" smtClean="0"/>
+              <a:rPr lang="en-US" dirty="0"/>
               <a:t>… with accurate stellar distances and velocities in real space</a:t>
             </a:r>
           </a:p>
           <a:p>
             <a:pPr lvl="1"/>
             <a:r>
-              <a:rPr lang="en-US" dirty="0" smtClean="0"/>
+              <a:rPr lang="en-US" dirty="0"/>
               <a:t>See: </a:t>
             </a:r>
             <a:r>
-              <a:rPr lang="en-US" dirty="0" smtClean="0">
+              <a:rPr lang="en-US" dirty="0">
                 <a:hlinkClick r:id="rId2"/>
               </a:rPr>
               <a:t>http://sci.esa.int/gaia/</a:t>
             </a:r>
-            <a:endParaRPr lang="en-US" dirty="0" smtClean="0"/>
-          </a:p>
-          <a:p>
-            <a:r>
-              <a:rPr lang="en-US" dirty="0" smtClean="0"/>
+            <a:endParaRPr lang="en-US" dirty="0"/>
+          </a:p>
+          <a:p>
+            <a:r>
+              <a:rPr lang="en-US" dirty="0"/>
               <a:t>Gaia Data Processing and Analysis Consortium (DPAC)</a:t>
             </a:r>
           </a:p>
           <a:p>
             <a:pPr lvl="1"/>
             <a:r>
-              <a:rPr lang="en-US" dirty="0" smtClean="0"/>
+              <a:rPr lang="en-US" dirty="0"/>
               <a:t>See: </a:t>
             </a:r>
             <a:r>
-              <a:rPr lang="en-US" dirty="0" smtClean="0">
+              <a:rPr lang="en-US" dirty="0">
                 <a:hlinkClick r:id="rId3"/>
               </a:rPr>
               <a:t>http://www.cosmos.esa.int/web/gaia/dpac</a:t>
             </a:r>
-            <a:endParaRPr lang="en-US" dirty="0" smtClean="0"/>
+            <a:endParaRPr lang="en-US" dirty="0"/>
           </a:p>
           <a:p>
             <a:pPr lvl="1"/>
@@ -3195,13 +3164,6 @@
   <p:clrMapOvr>
     <a:masterClrMapping/>
   </p:clrMapOvr>
-  <p:timing>
-    <p:tnLst>
-      <p:par>
-        <p:cTn id="1" dur="indefinite" restart="never" nodeType="tmRoot"/>
-      </p:par>
-    </p:tnLst>
-  </p:timing>
 </p:sld>
 </file>
 
@@ -3238,12 +3200,8 @@
           <a:lstStyle/>
           <a:p>
             <a:r>
-              <a:rPr lang="en-US" dirty="0" smtClean="0"/>
-              <a:t>Gaia Data Volum</a:t>
-            </a:r>
-            <a:r>
-              <a:rPr lang="en-US" dirty="0"/>
-              <a:t>e</a:t>
+              <a:rPr lang="en-US" dirty="0"/>
+              <a:t>Gaia Data Volume</a:t>
             </a:r>
           </a:p>
         </p:txBody>
@@ -3264,58 +3222,57 @@
           <a:lstStyle/>
           <a:p>
             <a:r>
-              <a:rPr lang="en-US" dirty="0" smtClean="0"/>
+              <a:rPr lang="en-US" dirty="0"/>
               <a:t>From the DPAC web site: “A primary motivation behind the Data Processing and Analysis Consortium (DPAC) is the unprecedented amount of data Gaia generates: surveying </a:t>
             </a:r>
             <a:r>
-              <a:rPr lang="en-US" b="1" dirty="0" smtClean="0"/>
+              <a:rPr lang="en-US" b="1" dirty="0"/>
               <a:t>1 billion stars</a:t>
             </a:r>
             <a:r>
-              <a:rPr lang="en-US" dirty="0" smtClean="0"/>
+              <a:rPr lang="en-US" dirty="0"/>
               <a:t>, </a:t>
             </a:r>
             <a:r>
-              <a:rPr lang="en-US" b="1" dirty="0" smtClean="0"/>
+              <a:rPr lang="en-US" b="1" dirty="0"/>
               <a:t>70 times each over five years amounts to an average of 70 million objects observed each day</a:t>
             </a:r>
             <a:r>
-              <a:rPr lang="en-US" dirty="0" smtClean="0"/>
+              <a:rPr lang="en-US" dirty="0"/>
               <a:t>! This translates into </a:t>
             </a:r>
             <a:r>
-              <a:rPr lang="en-US" b="1" dirty="0" smtClean="0"/>
+              <a:rPr lang="en-US" b="1" dirty="0"/>
               <a:t>40 Gigabytes of information per day</a:t>
             </a:r>
             <a:r>
-              <a:rPr lang="en-US" dirty="0" smtClean="0"/>
+              <a:rPr lang="en-US" dirty="0"/>
               <a:t>, or </a:t>
             </a:r>
             <a:r>
-              <a:rPr lang="en-US" b="1" dirty="0" smtClean="0"/>
+              <a:rPr lang="en-US" b="1" dirty="0"/>
               <a:t>73 Terabytes over the full, nominal life of the mission</a:t>
             </a:r>
             <a:r>
-              <a:rPr lang="en-US" dirty="0" smtClean="0"/>
+              <a:rPr lang="en-US" dirty="0"/>
               <a:t>. Taking into account the </a:t>
             </a:r>
             <a:r>
-              <a:rPr lang="en-US" i="1" dirty="0" smtClean="0"/>
+              <a:rPr lang="en-US" i="1" dirty="0"/>
               <a:t>additional data products </a:t>
             </a:r>
             <a:r>
-              <a:rPr lang="en-US" dirty="0" smtClean="0"/>
+              <a:rPr lang="en-US" dirty="0"/>
               <a:t>that are created from the basic observations leads to a </a:t>
             </a:r>
             <a:r>
-              <a:rPr lang="en-US" b="1" dirty="0" smtClean="0"/>
+              <a:rPr lang="en-US" b="1" dirty="0"/>
               <a:t>total volume of about 1 Petabyte (1 million Gigabytes) for the complete dataset</a:t>
             </a:r>
             <a:r>
-              <a:rPr lang="en-US" dirty="0" smtClean="0"/>
+              <a:rPr lang="en-US" dirty="0"/>
               <a:t>.”</a:t>
             </a:r>
-            <a:endParaRPr lang="en-US" dirty="0"/>
           </a:p>
         </p:txBody>
       </p:sp>
@@ -3329,13 +3286,6 @@
   <p:clrMapOvr>
     <a:masterClrMapping/>
   </p:clrMapOvr>
-  <p:timing>
-    <p:tnLst>
-      <p:par>
-        <p:cTn id="1" dur="indefinite" restart="never" nodeType="tmRoot"/>
-      </p:par>
-    </p:tnLst>
-  </p:timing>
 </p:sld>
 </file>
 
@@ -3372,10 +3322,9 @@
           <a:lstStyle/>
           <a:p>
             <a:r>
-              <a:rPr lang="en-US" dirty="0" smtClean="0"/>
+              <a:rPr lang="en-US" dirty="0"/>
               <a:t>What is Ga?</a:t>
             </a:r>
-            <a:endParaRPr lang="en-US" dirty="0"/>
           </a:p>
         </p:txBody>
       </p:sp>
@@ -3395,67 +3344,57 @@
           <a:lstStyle/>
           <a:p>
             <a:r>
-              <a:rPr lang="en-US" dirty="0" smtClean="0"/>
-              <a:t>Ga is an imaginary </a:t>
-            </a:r>
-            <a:r>
-              <a:rPr lang="en-US" dirty="0" err="1" smtClean="0"/>
-              <a:t>astrometrics</a:t>
-            </a:r>
-            <a:r>
-              <a:rPr lang="en-US" dirty="0" smtClean="0"/>
-              <a:t> mission producing imaginary data</a:t>
+              <a:rPr lang="en-US" dirty="0"/>
+              <a:t>Ga is an imaginary astrometrics mission producing imaginary data</a:t>
             </a:r>
           </a:p>
           <a:p>
             <a:pPr lvl="1"/>
             <a:r>
-              <a:rPr lang="en-US" dirty="0" smtClean="0"/>
+              <a:rPr lang="en-US" dirty="0"/>
               <a:t>Conceptually similar to Gaia, but far more limited</a:t>
             </a:r>
           </a:p>
           <a:p>
             <a:pPr lvl="1"/>
             <a:r>
-              <a:rPr lang="en-US" dirty="0" smtClean="0"/>
+              <a:rPr lang="en-US" dirty="0"/>
               <a:t>Much simpler</a:t>
             </a:r>
-            <a:endParaRPr lang="en-US" dirty="0"/>
-          </a:p>
-          <a:p>
-            <a:r>
-              <a:rPr lang="en-US" dirty="0" smtClean="0"/>
+          </a:p>
+          <a:p>
+            <a:r>
+              <a:rPr lang="en-US" dirty="0"/>
               <a:t>What is the point of Ga?</a:t>
             </a:r>
           </a:p>
           <a:p>
             <a:pPr lvl="1"/>
             <a:r>
-              <a:rPr lang="en-US" i="1" dirty="0" smtClean="0"/>
+              <a:rPr lang="en-US" i="1" dirty="0"/>
               <a:t>Educational!</a:t>
             </a:r>
           </a:p>
           <a:p>
             <a:pPr lvl="1"/>
             <a:r>
-              <a:rPr lang="en-US" dirty="0" smtClean="0"/>
+              <a:rPr lang="en-US" dirty="0"/>
               <a:t>We can generate as much (or as little) imaginary data as we require</a:t>
             </a:r>
           </a:p>
           <a:p>
             <a:pPr lvl="1"/>
             <a:r>
-              <a:rPr lang="en-US" dirty="0" smtClean="0"/>
+              <a:rPr lang="en-US" dirty="0"/>
               <a:t>We can generate imaginary data with whatever properties we want</a:t>
             </a:r>
           </a:p>
           <a:p>
             <a:pPr lvl="1"/>
             <a:r>
-              <a:rPr lang="en-US" dirty="0" smtClean="0"/>
+              <a:rPr lang="en-US" dirty="0"/>
               <a:t>We can avoid complicating factors, adding them later if desired</a:t>
             </a:r>
-            <a:endParaRPr lang="en-US" dirty="0"/>
           </a:p>
         </p:txBody>
       </p:sp>
@@ -3469,13 +3408,6 @@
   <p:clrMapOvr>
     <a:masterClrMapping/>
   </p:clrMapOvr>
-  <p:timing>
-    <p:tnLst>
-      <p:par>
-        <p:cTn id="1" dur="indefinite" restart="never" nodeType="tmRoot"/>
-      </p:par>
-    </p:tnLst>
-  </p:timing>
 </p:sld>
 </file>
 
@@ -3512,10 +3444,9 @@
           <a:lstStyle/>
           <a:p>
             <a:r>
-              <a:rPr lang="en-US" dirty="0" smtClean="0"/>
+              <a:rPr lang="en-US" dirty="0"/>
               <a:t>How Many Stars?</a:t>
             </a:r>
-            <a:endParaRPr lang="en-US" dirty="0"/>
           </a:p>
         </p:txBody>
       </p:sp>
@@ -3535,83 +3466,82 @@
           <a:lstStyle/>
           <a:p>
             <a:r>
-              <a:rPr lang="en-US" dirty="0" smtClean="0"/>
+              <a:rPr lang="en-US" dirty="0"/>
               <a:t>Assume…</a:t>
             </a:r>
           </a:p>
           <a:p>
             <a:pPr lvl="1"/>
             <a:r>
-              <a:rPr lang="en-US" dirty="0" smtClean="0"/>
+              <a:rPr lang="en-US" dirty="0"/>
               <a:t>Average stellar separation is 4 </a:t>
             </a:r>
             <a:r>
-              <a:rPr lang="en-US" dirty="0" err="1" smtClean="0"/>
+              <a:rPr lang="en-US" dirty="0" err="1"/>
               <a:t>ly</a:t>
             </a:r>
             <a:r>
-              <a:rPr lang="en-US" dirty="0" smtClean="0"/>
+              <a:rPr lang="en-US" dirty="0"/>
               <a:t>. (The distance between the sun and the </a:t>
             </a:r>
             <a:r>
-              <a:rPr lang="el-GR" dirty="0" smtClean="0"/>
+              <a:rPr lang="el-GR" dirty="0"/>
               <a:t>α</a:t>
             </a:r>
             <a:r>
-              <a:rPr lang="en-US" dirty="0" smtClean="0"/>
+              <a:rPr lang="en-US" dirty="0"/>
               <a:t>-</a:t>
             </a:r>
             <a:r>
-              <a:rPr lang="en-US" dirty="0" err="1" smtClean="0"/>
+              <a:rPr lang="en-US" dirty="0" err="1"/>
               <a:t>Centuri</a:t>
             </a:r>
             <a:r>
-              <a:rPr lang="en-US" dirty="0" smtClean="0"/>
+              <a:rPr lang="en-US" dirty="0"/>
               <a:t> system)</a:t>
             </a:r>
           </a:p>
           <a:p>
             <a:pPr lvl="1"/>
             <a:r>
-              <a:rPr lang="en-US" dirty="0" smtClean="0"/>
+              <a:rPr lang="en-US" dirty="0"/>
               <a:t>One star in a box 4 </a:t>
             </a:r>
             <a:r>
-              <a:rPr lang="en-US" dirty="0" err="1" smtClean="0"/>
+              <a:rPr lang="en-US" dirty="0" err="1"/>
               <a:t>ly</a:t>
             </a:r>
             <a:r>
-              <a:rPr lang="en-US" dirty="0" smtClean="0"/>
+              <a:rPr lang="en-US" dirty="0"/>
               <a:t> on a side =&gt; density = 0.016 stars per cubic </a:t>
             </a:r>
             <a:r>
-              <a:rPr lang="en-US" dirty="0" err="1" smtClean="0"/>
+              <a:rPr lang="en-US" dirty="0" err="1"/>
               <a:t>ly</a:t>
             </a:r>
             <a:r>
-              <a:rPr lang="en-US" dirty="0" smtClean="0"/>
+              <a:rPr lang="en-US" dirty="0"/>
               <a:t>.</a:t>
             </a:r>
           </a:p>
           <a:p>
             <a:pPr lvl="1"/>
             <a:r>
-              <a:rPr lang="en-US" dirty="0" smtClean="0"/>
+              <a:rPr lang="en-US" dirty="0"/>
               <a:t>Number of stars in a sphere with radius r light years =&gt; 0.016 * (4/3)</a:t>
             </a:r>
             <a:r>
-              <a:rPr lang="el-GR" dirty="0" smtClean="0"/>
+              <a:rPr lang="el-GR" dirty="0"/>
               <a:t>π</a:t>
             </a:r>
             <a:r>
-              <a:rPr lang="en-US" dirty="0" smtClean="0"/>
+              <a:rPr lang="en-US" dirty="0"/>
               <a:t>r</a:t>
             </a:r>
             <a:r>
-              <a:rPr lang="en-US" baseline="30000" dirty="0" smtClean="0"/>
+              <a:rPr lang="en-US" baseline="30000" dirty="0"/>
               <a:t>3</a:t>
             </a:r>
-            <a:endParaRPr lang="en-US" baseline="30000" dirty="0"/>
           </a:p>
         </p:txBody>
       </p:sp>
@@ -3640,8 +3570,20 @@
                 <a:tableStyleId>{5C22544A-7EE6-4342-B048-85BDC9FD1C3A}</a:tableStyleId>
               </a:tblPr>
               <a:tblGrid>
-                <a:gridCol w="4064000"/>
-                <a:gridCol w="4064000"/>
+                <a:gridCol w="4064000">
+                  <a:extLst>
+                    <a:ext uri="{9D8B030D-6E8A-4147-A177-3AD203B41FA5}">
+                      <a16:colId xmlns:a16="http://schemas.microsoft.com/office/drawing/2014/main" val="20000"/>
+                    </a:ext>
+                  </a:extLst>
+                </a:gridCol>
+                <a:gridCol w="4064000">
+                  <a:extLst>
+                    <a:ext uri="{9D8B030D-6E8A-4147-A177-3AD203B41FA5}">
+                      <a16:colId xmlns:a16="http://schemas.microsoft.com/office/drawing/2014/main" val="20001"/>
+                    </a:ext>
+                  </a:extLst>
+                </a:gridCol>
               </a:tblGrid>
               <a:tr h="370840">
                 <a:tc>
@@ -3650,10 +3592,9 @@
                     <a:lstStyle/>
                     <a:p>
                       <a:r>
-                        <a:rPr lang="en-US" dirty="0" smtClean="0"/>
+                        <a:rPr lang="en-US" dirty="0"/>
                         <a:t>Radius (light years)</a:t>
                       </a:r>
-                      <a:endParaRPr lang="en-US" dirty="0"/>
                     </a:p>
                   </a:txBody>
                   <a:tcPr/>
@@ -3664,14 +3605,18 @@
                     <a:lstStyle/>
                     <a:p>
                       <a:r>
-                        <a:rPr lang="en-US" dirty="0" smtClean="0"/>
+                        <a:rPr lang="en-US" dirty="0"/>
                         <a:t>Number of Stars</a:t>
                       </a:r>
-                      <a:endParaRPr lang="en-US" dirty="0"/>
                     </a:p>
                   </a:txBody>
                   <a:tcPr/>
                 </a:tc>
+                <a:extLst>
+                  <a:ext uri="{0D108BD9-81ED-4DB2-BD59-A6C34878D82A}">
+                    <a16:rowId xmlns:a16="http://schemas.microsoft.com/office/drawing/2014/main" val="10000"/>
+                  </a:ext>
+                </a:extLst>
               </a:tr>
               <a:tr h="370840">
                 <a:tc>
@@ -3680,10 +3625,9 @@
                     <a:lstStyle/>
                     <a:p>
                       <a:r>
-                        <a:rPr lang="en-US" dirty="0" smtClean="0"/>
+                        <a:rPr lang="en-US" dirty="0"/>
                         <a:t>10</a:t>
                       </a:r>
-                      <a:endParaRPr lang="en-US" dirty="0"/>
                     </a:p>
                   </a:txBody>
                   <a:tcPr/>
@@ -3694,14 +3638,18 @@
                     <a:lstStyle/>
                     <a:p>
                       <a:r>
-                        <a:rPr lang="en-US" dirty="0" smtClean="0"/>
+                        <a:rPr lang="en-US" dirty="0"/>
                         <a:t>67</a:t>
                       </a:r>
-                      <a:endParaRPr lang="en-US" dirty="0"/>
                     </a:p>
                   </a:txBody>
                   <a:tcPr/>
                 </a:tc>
+                <a:extLst>
+                  <a:ext uri="{0D108BD9-81ED-4DB2-BD59-A6C34878D82A}">
+                    <a16:rowId xmlns:a16="http://schemas.microsoft.com/office/drawing/2014/main" val="10001"/>
+                  </a:ext>
+                </a:extLst>
               </a:tr>
               <a:tr h="370840">
                 <a:tc>
@@ -3710,10 +3658,9 @@
                     <a:lstStyle/>
                     <a:p>
                       <a:r>
-                        <a:rPr lang="en-US" dirty="0" smtClean="0"/>
+                        <a:rPr lang="en-US" dirty="0"/>
                         <a:t>100</a:t>
                       </a:r>
-                      <a:endParaRPr lang="en-US" dirty="0"/>
                     </a:p>
                   </a:txBody>
                   <a:tcPr/>
@@ -3724,14 +3671,18 @@
                     <a:lstStyle/>
                     <a:p>
                       <a:r>
-                        <a:rPr lang="en-US" dirty="0" smtClean="0"/>
+                        <a:rPr lang="en-US" dirty="0"/>
                         <a:t>67,000</a:t>
                       </a:r>
-                      <a:endParaRPr lang="en-US" dirty="0"/>
                     </a:p>
                   </a:txBody>
                   <a:tcPr/>
                 </a:tc>
+                <a:extLst>
+                  <a:ext uri="{0D108BD9-81ED-4DB2-BD59-A6C34878D82A}">
+                    <a16:rowId xmlns:a16="http://schemas.microsoft.com/office/drawing/2014/main" val="10002"/>
+                  </a:ext>
+                </a:extLst>
               </a:tr>
               <a:tr h="370840">
                 <a:tc>
@@ -3740,10 +3691,9 @@
                     <a:lstStyle/>
                     <a:p>
                       <a:r>
-                        <a:rPr lang="en-US" dirty="0" smtClean="0"/>
+                        <a:rPr lang="en-US" dirty="0"/>
                         <a:t>1,000</a:t>
                       </a:r>
-                      <a:endParaRPr lang="en-US" dirty="0"/>
                     </a:p>
                   </a:txBody>
                   <a:tcPr/>
@@ -3754,14 +3704,18 @@
                     <a:lstStyle/>
                     <a:p>
                       <a:r>
-                        <a:rPr lang="en-US" dirty="0" smtClean="0"/>
+                        <a:rPr lang="en-US" dirty="0"/>
                         <a:t>67,000,000</a:t>
                       </a:r>
-                      <a:endParaRPr lang="en-US" dirty="0"/>
                     </a:p>
                   </a:txBody>
                   <a:tcPr/>
                 </a:tc>
+                <a:extLst>
+                  <a:ext uri="{0D108BD9-81ED-4DB2-BD59-A6C34878D82A}">
+                    <a16:rowId xmlns:a16="http://schemas.microsoft.com/office/drawing/2014/main" val="10003"/>
+                  </a:ext>
+                </a:extLst>
               </a:tr>
               <a:tr h="370840">
                 <a:tc>
@@ -3770,10 +3724,9 @@
                     <a:lstStyle/>
                     <a:p>
                       <a:r>
-                        <a:rPr lang="en-US" dirty="0" smtClean="0"/>
+                        <a:rPr lang="en-US" dirty="0"/>
                         <a:t>10,000</a:t>
                       </a:r>
-                      <a:endParaRPr lang="en-US" dirty="0"/>
                     </a:p>
                   </a:txBody>
                   <a:tcPr/>
@@ -3784,14 +3737,18 @@
                     <a:lstStyle/>
                     <a:p>
                       <a:r>
-                        <a:rPr lang="en-US" dirty="0" smtClean="0"/>
+                        <a:rPr lang="en-US" dirty="0"/>
                         <a:t>67,000,000,000</a:t>
                       </a:r>
-                      <a:endParaRPr lang="en-US" dirty="0"/>
                     </a:p>
                   </a:txBody>
                   <a:tcPr/>
                 </a:tc>
+                <a:extLst>
+                  <a:ext uri="{0D108BD9-81ED-4DB2-BD59-A6C34878D82A}">
+                    <a16:rowId xmlns:a16="http://schemas.microsoft.com/office/drawing/2014/main" val="10004"/>
+                  </a:ext>
+                </a:extLst>
               </a:tr>
             </a:tbl>
           </a:graphicData>
@@ -3807,13 +3764,6 @@
   <p:clrMapOvr>
     <a:masterClrMapping/>
   </p:clrMapOvr>
-  <p:timing>
-    <p:tnLst>
-      <p:par>
-        <p:cTn id="1" dur="indefinite" restart="never" nodeType="tmRoot"/>
-      </p:par>
-    </p:tnLst>
-  </p:timing>
 </p:sld>
 </file>
 
@@ -3850,10 +3800,9 @@
           <a:lstStyle/>
           <a:p>
             <a:r>
-              <a:rPr lang="en-US" dirty="0" smtClean="0"/>
+              <a:rPr lang="en-US" dirty="0"/>
               <a:t>Realistic?</a:t>
             </a:r>
-            <a:endParaRPr lang="en-US" dirty="0"/>
           </a:p>
         </p:txBody>
       </p:sp>
@@ -3873,63 +3822,63 @@
           <a:lstStyle/>
           <a:p>
             <a:r>
-              <a:rPr lang="en-US" dirty="0" smtClean="0"/>
+              <a:rPr lang="en-US" dirty="0"/>
               <a:t>In the real galaxy…</a:t>
             </a:r>
           </a:p>
           <a:p>
             <a:pPr lvl="1"/>
             <a:r>
-              <a:rPr lang="en-US" dirty="0" smtClean="0"/>
+              <a:rPr lang="en-US" dirty="0"/>
               <a:t>The stellar density is not uniform</a:t>
             </a:r>
           </a:p>
           <a:p>
             <a:pPr lvl="2"/>
             <a:r>
-              <a:rPr lang="en-US" dirty="0" smtClean="0"/>
+              <a:rPr lang="en-US" dirty="0"/>
               <a:t>Stars primarily in a disk of spiral arms</a:t>
             </a:r>
           </a:p>
           <a:p>
             <a:pPr lvl="2"/>
             <a:r>
-              <a:rPr lang="en-US" dirty="0" smtClean="0"/>
+              <a:rPr lang="en-US" dirty="0"/>
               <a:t>Greater density in the core; less in the arms; even less between the arms</a:t>
             </a:r>
           </a:p>
           <a:p>
             <a:pPr lvl="1"/>
             <a:r>
-              <a:rPr lang="en-US" dirty="0" smtClean="0"/>
+              <a:rPr lang="en-US" dirty="0"/>
               <a:t>The galaxy is about 100,000 </a:t>
             </a:r>
             <a:r>
-              <a:rPr lang="en-US" dirty="0" err="1" smtClean="0"/>
+              <a:rPr lang="en-US" dirty="0" err="1"/>
               <a:t>ly</a:t>
             </a:r>
             <a:r>
-              <a:rPr lang="en-US" dirty="0" smtClean="0"/>
+              <a:rPr lang="en-US" dirty="0"/>
               <a:t> across; contains ~250 billion stars</a:t>
             </a:r>
           </a:p>
           <a:p>
             <a:pPr lvl="2"/>
             <a:r>
-              <a:rPr lang="en-US" dirty="0" smtClean="0"/>
+              <a:rPr lang="en-US" dirty="0"/>
               <a:t>Makes you realize how little Gaia is actually going to observe!</a:t>
             </a:r>
           </a:p>
           <a:p>
             <a:pPr lvl="1"/>
             <a:r>
-              <a:rPr lang="en-US" dirty="0" smtClean="0"/>
+              <a:rPr lang="en-US" dirty="0"/>
               <a:t>The numbers on the previous slide are in the right general range</a:t>
             </a:r>
           </a:p>
           <a:p>
             <a:r>
-              <a:rPr lang="en-US" dirty="0" smtClean="0"/>
+              <a:rPr lang="en-US" dirty="0"/>
               <a:t>The Ga imaginary data should be at about this scale</a:t>
             </a:r>
           </a:p>
@@ -3945,13 +3894,6 @@
   <p:clrMapOvr>
     <a:masterClrMapping/>
   </p:clrMapOvr>
-  <p:timing>
-    <p:tnLst>
-      <p:par>
-        <p:cTn id="1" dur="indefinite" restart="never" nodeType="tmRoot"/>
-      </p:par>
-    </p:tnLst>
-  </p:timing>
 </p:sld>
 </file>
 
@@ -3988,10 +3930,9 @@
           <a:lstStyle/>
           <a:p>
             <a:r>
-              <a:rPr lang="en-US" dirty="0" smtClean="0"/>
+              <a:rPr lang="en-US" dirty="0"/>
               <a:t>Ga Data Set</a:t>
             </a:r>
-            <a:endParaRPr lang="en-US" dirty="0"/>
           </a:p>
         </p:txBody>
       </p:sp>
@@ -4011,41 +3952,41 @@
           <a:lstStyle/>
           <a:p>
             <a:r>
-              <a:rPr lang="en-US" dirty="0" smtClean="0"/>
+              <a:rPr lang="en-US" dirty="0"/>
               <a:t>Let Ga observe all stars out to about 1000 light years</a:t>
             </a:r>
           </a:p>
           <a:p>
             <a:pPr lvl="1"/>
             <a:r>
-              <a:rPr lang="en-US" dirty="0" smtClean="0"/>
+              <a:rPr lang="en-US" dirty="0"/>
               <a:t>Assume: 50 million stars</a:t>
             </a:r>
           </a:p>
           <a:p>
             <a:r>
-              <a:rPr lang="en-US" dirty="0" smtClean="0"/>
+              <a:rPr lang="en-US" dirty="0"/>
               <a:t>Let Ga observe all these stars once per day</a:t>
             </a:r>
           </a:p>
           <a:p>
             <a:pPr lvl="1"/>
             <a:r>
-              <a:rPr lang="en-US" dirty="0" smtClean="0"/>
+              <a:rPr lang="en-US" dirty="0"/>
               <a:t>That’s 50 million observations per day</a:t>
             </a:r>
           </a:p>
           <a:p>
             <a:pPr lvl="1"/>
             <a:r>
-              <a:rPr lang="en-US" dirty="0" smtClean="0"/>
+              <a:rPr lang="en-US" dirty="0"/>
               <a:t>Gaia is doing 70 million observations per day, so this isn’t a crazy amount</a:t>
             </a:r>
           </a:p>
           <a:p>
             <a:pPr lvl="1"/>
             <a:r>
-              <a:rPr lang="en-US" dirty="0" smtClean="0"/>
+              <a:rPr lang="en-US" dirty="0"/>
               <a:t>Total = 365*50 million = 17.8 billion observations per year</a:t>
             </a:r>
           </a:p>
@@ -4061,13 +4002,6 @@
   <p:clrMapOvr>
     <a:masterClrMapping/>
   </p:clrMapOvr>
-  <p:timing>
-    <p:tnLst>
-      <p:par>
-        <p:cTn id="1" dur="indefinite" restart="never" nodeType="tmRoot"/>
-      </p:par>
-    </p:tnLst>
-  </p:timing>
 </p:sld>
 </file>
 
@@ -4104,10 +4038,9 @@
           <a:lstStyle/>
           <a:p>
             <a:r>
-              <a:rPr lang="en-US" dirty="0" smtClean="0"/>
+              <a:rPr lang="en-US" dirty="0"/>
               <a:t>Ga Observation</a:t>
             </a:r>
-            <a:endParaRPr lang="en-US" dirty="0"/>
           </a:p>
         </p:txBody>
       </p:sp>
@@ -4127,123 +4060,73 @@
           <a:lstStyle/>
           <a:p>
             <a:r>
-              <a:rPr lang="en-US" dirty="0" smtClean="0"/>
+              <a:rPr lang="en-US" dirty="0"/>
               <a:t>Each observation is a line of text containing:</a:t>
             </a:r>
           </a:p>
           <a:p>
             <a:pPr lvl="1"/>
             <a:r>
-              <a:rPr lang="en-US" dirty="0" smtClean="0"/>
-              <a:t>The </a:t>
-            </a:r>
-            <a:r>
-              <a:rPr lang="en-US" dirty="0" smtClean="0"/>
-              <a:t>JD number </a:t>
-            </a:r>
-            <a:r>
-              <a:rPr lang="en-US" dirty="0" smtClean="0"/>
-              <a:t>(12 </a:t>
-            </a:r>
-            <a:r>
-              <a:rPr lang="en-US" dirty="0" smtClean="0"/>
-              <a:t>characters, e.g.: 2417815.4650)</a:t>
+              <a:rPr lang="en-US" dirty="0"/>
+              <a:t>The JD number (12 characters, e.g.: 2417815.4650)</a:t>
             </a:r>
           </a:p>
           <a:p>
             <a:pPr lvl="1"/>
             <a:r>
-              <a:rPr lang="en-US" dirty="0" smtClean="0"/>
+              <a:rPr lang="en-US" dirty="0"/>
               <a:t>The star’s ID number (8 digits)</a:t>
             </a:r>
           </a:p>
           <a:p>
             <a:pPr lvl="1"/>
             <a:r>
-              <a:rPr lang="en-US" dirty="0" smtClean="0"/>
-              <a:t>The precise position of the star on the sky </a:t>
-            </a:r>
-            <a:r>
-              <a:rPr lang="en-US" dirty="0" smtClean="0"/>
-              <a:t>using ecliptic longitude and latitude (in degrees to </a:t>
-            </a:r>
-            <a:r>
-              <a:rPr lang="en-US" dirty="0" smtClean="0"/>
-              <a:t>10 </a:t>
-            </a:r>
-            <a:r>
-              <a:rPr lang="el-GR" dirty="0" smtClean="0"/>
+              <a:rPr lang="en-US" dirty="0"/>
+              <a:t>The precise position of the star on the sky using ecliptic longitude and latitude (in degrees to 10 </a:t>
+            </a:r>
+            <a:r>
+              <a:rPr lang="el-GR" dirty="0"/>
               <a:t>μ</a:t>
             </a:r>
             <a:r>
-              <a:rPr lang="en-US" dirty="0" smtClean="0"/>
-              <a:t>as resolution, e.g.: </a:t>
-            </a:r>
-            <a:r>
-              <a:rPr lang="en-US" dirty="0" smtClean="0"/>
-              <a:t>+020.123456789,</a:t>
-            </a:r>
-            <a:r>
-              <a:rPr lang="en-US" dirty="0" smtClean="0"/>
-              <a:t>-20.123456789</a:t>
-            </a:r>
-            <a:r>
-              <a:rPr lang="en-US" dirty="0" smtClean="0"/>
-              <a:t>)</a:t>
-            </a:r>
-            <a:endParaRPr lang="en-US" dirty="0" smtClean="0"/>
+              <a:rPr lang="en-US" dirty="0"/>
+              <a:t>as resolution, e.g.: +020.123456789,-20.123456789)</a:t>
+            </a:r>
           </a:p>
           <a:p>
             <a:pPr lvl="2"/>
             <a:r>
-              <a:rPr lang="en-US" dirty="0" smtClean="0"/>
+              <a:rPr lang="en-US" dirty="0"/>
               <a:t>That’s approximately the resolution Gaia has</a:t>
             </a:r>
           </a:p>
           <a:p>
             <a:r>
-              <a:rPr lang="en-US" dirty="0" smtClean="0"/>
-              <a:t>Total of </a:t>
-            </a:r>
-            <a:r>
-              <a:rPr lang="en-US" dirty="0" smtClean="0"/>
-              <a:t>51 </a:t>
-            </a:r>
-            <a:r>
-              <a:rPr lang="en-US" dirty="0" smtClean="0"/>
-              <a:t>characters per observation</a:t>
-            </a:r>
-          </a:p>
-          <a:p>
-            <a:r>
-              <a:rPr lang="en-US" dirty="0" smtClean="0"/>
-              <a:t>Data Set = </a:t>
-            </a:r>
-            <a:r>
-              <a:rPr lang="en-US" dirty="0" smtClean="0"/>
-              <a:t>51 </a:t>
-            </a:r>
-            <a:r>
-              <a:rPr lang="en-US" dirty="0" smtClean="0"/>
-              <a:t>* 17.8 billion = </a:t>
-            </a:r>
-            <a:r>
-              <a:rPr lang="en-US" b="1" dirty="0" smtClean="0"/>
+              <a:rPr lang="en-US" dirty="0"/>
+              <a:t>Total of 51 characters per observation</a:t>
+            </a:r>
+          </a:p>
+          <a:p>
+            <a:r>
+              <a:rPr lang="en-US" dirty="0"/>
+              <a:t>Data Set = 51 * 17.8 billion = </a:t>
+            </a:r>
+            <a:r>
+              <a:rPr lang="en-US" b="1" dirty="0"/>
               <a:t>908 </a:t>
             </a:r>
             <a:r>
-              <a:rPr lang="en-US" b="1" dirty="0" err="1" smtClean="0"/>
+              <a:rPr lang="en-US" b="1" dirty="0" err="1"/>
               <a:t>GiB</a:t>
             </a:r>
-            <a:endParaRPr lang="en-US" b="1" dirty="0" smtClean="0"/>
+            <a:endParaRPr lang="en-US" b="1" dirty="0"/>
           </a:p>
           <a:p>
             <a:pPr lvl="1"/>
             <a:r>
-              <a:rPr lang="en-US" dirty="0" smtClean="0"/>
+              <a:rPr lang="en-US" dirty="0"/>
               <a:t>We will tune the size of the data set by adjusting the number of stars (and hence the average stellar density)</a:t>
             </a:r>
-            <a:endParaRPr lang="en-US" dirty="0"/>
           </a:p>
         </p:txBody>
       </p:sp>
@@ -4257,13 +4140,6 @@
   <p:clrMapOvr>
     <a:masterClrMapping/>
   </p:clrMapOvr>
-  <p:timing>
-    <p:tnLst>
-      <p:par>
-        <p:cTn id="1" dur="indefinite" restart="never" nodeType="tmRoot"/>
-      </p:par>
-    </p:tnLst>
-  </p:timing>
 </p:sld>
 </file>
 
@@ -4300,10 +4176,9 @@
           <a:lstStyle/>
           <a:p>
             <a:r>
-              <a:rPr lang="en-US" dirty="0" smtClean="0"/>
+              <a:rPr lang="en-US" dirty="0"/>
               <a:t>Imaginary Data Generator</a:t>
             </a:r>
-            <a:endParaRPr lang="en-US" dirty="0"/>
           </a:p>
         </p:txBody>
       </p:sp>
@@ -4323,61 +4198,61 @@
           <a:lstStyle/>
           <a:p>
             <a:r>
-              <a:rPr lang="en-US" dirty="0" smtClean="0"/>
+              <a:rPr lang="en-US" dirty="0"/>
               <a:t>The Imaginary Data Generator (IDG) creates “fake” Ga data</a:t>
             </a:r>
           </a:p>
           <a:p>
             <a:pPr lvl="1"/>
             <a:r>
-              <a:rPr lang="en-US" dirty="0" smtClean="0"/>
+              <a:rPr lang="en-US" dirty="0"/>
               <a:t>A program that takes the number of stars as a parameter</a:t>
             </a:r>
           </a:p>
           <a:p>
             <a:pPr lvl="1"/>
             <a:r>
-              <a:rPr lang="en-US" dirty="0" smtClean="0"/>
+              <a:rPr lang="en-US" dirty="0"/>
               <a:t>Generates observations for the year 2020</a:t>
             </a:r>
           </a:p>
           <a:p>
             <a:pPr lvl="1"/>
             <a:r>
-              <a:rPr lang="en-US" dirty="0" smtClean="0"/>
+              <a:rPr lang="en-US" dirty="0"/>
               <a:t>Outputs the data to a file</a:t>
             </a:r>
           </a:p>
           <a:p>
             <a:r>
-              <a:rPr lang="en-US" dirty="0" smtClean="0"/>
+              <a:rPr lang="en-US" dirty="0"/>
               <a:t>Current version of IDG is very simple minded</a:t>
             </a:r>
           </a:p>
           <a:p>
             <a:pPr lvl="1"/>
             <a:r>
-              <a:rPr lang="en-US" dirty="0" smtClean="0"/>
+              <a:rPr lang="en-US" dirty="0"/>
               <a:t>Future versions could embed various “interesting” effects in the data that later analysis can find.</a:t>
             </a:r>
           </a:p>
           <a:p>
             <a:r>
-              <a:rPr lang="en-US" dirty="0" smtClean="0"/>
+              <a:rPr lang="en-US" dirty="0"/>
               <a:t>IDG written in Scala and available on the class web site</a:t>
             </a:r>
           </a:p>
           <a:p>
             <a:pPr lvl="1"/>
             <a:r>
-              <a:rPr lang="en-US" dirty="0" smtClean="0"/>
+              <a:rPr lang="en-US" dirty="0"/>
               <a:t>You can create imaginary data at a small scale for local testing</a:t>
             </a:r>
           </a:p>
           <a:p>
             <a:pPr lvl="1"/>
             <a:r>
-              <a:rPr lang="en-US" dirty="0" smtClean="0"/>
+              <a:rPr lang="en-US" dirty="0"/>
               <a:t>We can create imaginary data at a large scale for performance testing</a:t>
             </a:r>
           </a:p>
@@ -4393,13 +4268,6 @@
   <p:clrMapOvr>
     <a:masterClrMapping/>
   </p:clrMapOvr>
-  <p:timing>
-    <p:tnLst>
-      <p:par>
-        <p:cTn id="1" dur="indefinite" restart="never" nodeType="tmRoot"/>
-      </p:par>
-    </p:tnLst>
-  </p:timing>
 </p:sld>
 </file>
 

</xml_diff>